<commit_message>
fix bug due to time series issues
</commit_message>
<xml_diff>
--- a/六边形扫雷.pptx
+++ b/六边形扫雷.pptx
@@ -14,6 +14,7 @@
     <p:sldId id="259" r:id="rId8"/>
     <p:sldId id="261" r:id="rId9"/>
     <p:sldId id="262" r:id="rId10"/>
+    <p:sldId id="266" r:id="rId11"/>
   </p:sldIdLst>
   <p:sldSz cx="12192000" cy="6858000"/>
   <p:notesSz cx="6858000" cy="9144000"/>
@@ -112,6 +113,11 @@
       </a:defRPr>
     </a:lvl9pPr>
   </p:defaultTextStyle>
+  <p:extLst>
+    <p:ext uri="{EFAFB233-063F-42B5-8137-9DF3F51BA10A}">
+      <p15:sldGuideLst xmlns:p15="http://schemas.microsoft.com/office/powerpoint/2012/main"/>
+    </p:ext>
+  </p:extLst>
 </p:presentation>
 </file>
 
@@ -3395,6 +3401,92 @@
 </p:sld>
 </file>
 
+<file path=ppt/slides/slide10.xml><?xml version="1.0" encoding="utf-8"?>
+<p:sld xmlns:a="http://schemas.openxmlformats.org/drawingml/2006/main" xmlns:r="http://schemas.openxmlformats.org/officeDocument/2006/relationships" xmlns:p="http://schemas.openxmlformats.org/presentationml/2006/main">
+  <p:cSld>
+    <p:spTree>
+      <p:nvGrpSpPr>
+        <p:cNvPr id="1" name=""/>
+        <p:cNvGrpSpPr/>
+        <p:nvPr/>
+      </p:nvGrpSpPr>
+      <p:grpSpPr>
+        <a:xfrm>
+          <a:off x="0" y="0"/>
+          <a:ext cx="0" cy="0"/>
+          <a:chOff x="0" y="0"/>
+          <a:chExt cx="0" cy="0"/>
+        </a:xfrm>
+      </p:grpSpPr>
+      <p:sp>
+        <p:nvSpPr>
+          <p:cNvPr id="2" name="标题 1">
+            <a:extLst>
+              <a:ext uri="{FF2B5EF4-FFF2-40B4-BE49-F238E27FC236}">
+                <a16:creationId xmlns:a16="http://schemas.microsoft.com/office/drawing/2014/main" id="{810989A0-400A-4D70-8FE7-DF3430346F2C}"/>
+              </a:ext>
+            </a:extLst>
+          </p:cNvPr>
+          <p:cNvSpPr>
+            <a:spLocks noGrp="1"/>
+          </p:cNvSpPr>
+          <p:nvPr>
+            <p:ph type="title"/>
+          </p:nvPr>
+        </p:nvSpPr>
+        <p:spPr/>
+        <p:txBody>
+          <a:bodyPr/>
+          <a:lstStyle/>
+          <a:p>
+            <a:r>
+              <a:rPr lang="zh-CN" altLang="en-US" dirty="0"/>
+              <a:t>游戏展示</a:t>
+            </a:r>
+          </a:p>
+        </p:txBody>
+      </p:sp>
+      <p:sp>
+        <p:nvSpPr>
+          <p:cNvPr id="3" name="内容占位符 2">
+            <a:extLst>
+              <a:ext uri="{FF2B5EF4-FFF2-40B4-BE49-F238E27FC236}">
+                <a16:creationId xmlns:a16="http://schemas.microsoft.com/office/drawing/2014/main" id="{BFD22998-4D33-460D-9EAB-385329CD466C}"/>
+              </a:ext>
+            </a:extLst>
+          </p:cNvPr>
+          <p:cNvSpPr>
+            <a:spLocks noGrp="1"/>
+          </p:cNvSpPr>
+          <p:nvPr>
+            <p:ph idx="1"/>
+          </p:nvPr>
+        </p:nvSpPr>
+        <p:spPr/>
+        <p:txBody>
+          <a:bodyPr/>
+          <a:lstStyle/>
+          <a:p>
+            <a:r>
+              <a:rPr lang="zh-CN" altLang="en-US" dirty="0"/>
+              <a:t>观看一局游戏</a:t>
+            </a:r>
+          </a:p>
+        </p:txBody>
+      </p:sp>
+    </p:spTree>
+    <p:extLst>
+      <p:ext uri="{BB962C8B-B14F-4D97-AF65-F5344CB8AC3E}">
+        <p14:creationId xmlns:p14="http://schemas.microsoft.com/office/powerpoint/2010/main" val="41425159"/>
+      </p:ext>
+    </p:extLst>
+  </p:cSld>
+  <p:clrMapOvr>
+    <a:masterClrMapping/>
+  </p:clrMapOvr>
+</p:sld>
+</file>
+
 <file path=ppt/slides/slide2.xml><?xml version="1.0" encoding="utf-8"?>
 <p:sld xmlns:a="http://schemas.openxmlformats.org/drawingml/2006/main" xmlns:r="http://schemas.openxmlformats.org/officeDocument/2006/relationships" xmlns:p="http://schemas.openxmlformats.org/presentationml/2006/main">
   <p:cSld>
@@ -4095,8 +4187,15 @@
             </a:r>
             <a:r>
               <a:rPr lang="zh-CN" altLang="en-US" dirty="0"/>
-              <a:t>文件对其初始化技术</a:t>
-            </a:r>
+              <a:t>文件对其</a:t>
+            </a:r>
+            <a:r>
+              <a:rPr lang="zh-CN" altLang="en-US"/>
+              <a:t>初始化技术</a:t>
+            </a:r>
+            <a:endParaRPr lang="en-US" altLang="zh-CN" dirty="0"/>
+          </a:p>
+          <a:p>
             <a:endParaRPr lang="en-US" altLang="zh-CN" dirty="0"/>
           </a:p>
           <a:p>
@@ -4112,6 +4211,9 @@
               <a:rPr lang="zh-CN" altLang="en-US" dirty="0"/>
               <a:t>接口的交互和异常处理技术</a:t>
             </a:r>
+            <a:endParaRPr lang="en-US" altLang="zh-CN" dirty="0"/>
+          </a:p>
+          <a:p>
             <a:endParaRPr lang="en-US" altLang="zh-CN" dirty="0"/>
           </a:p>
           <a:p>

</xml_diff>